<commit_message>
ignore warning on colab authoring
</commit_message>
<xml_diff>
--- a/Slides.pptx
+++ b/Slides.pptx
@@ -6644,7 +6644,7 @@
         <p:spPr>
           <a:xfrm>
             <a:off x="8899283" y="4536855"/>
-            <a:ext cx="1870794" cy="646331"/>
+            <a:ext cx="2382144" cy="1754326"/>
           </a:xfrm>
           <a:prstGeom prst="rect">
             <a:avLst/>
@@ -6678,6 +6678,15 @@
               <a:t>Colab</a:t>
             </a:r>
             <a:endParaRPr lang="en-US" i="1" dirty="0"/>
+          </a:p>
+          <a:p>
+            <a:endParaRPr lang="en-US" i="1" dirty="0"/>
+          </a:p>
+          <a:p>
+            <a:r>
+              <a:rPr lang="en-US" dirty="0"/>
+              <a:t>Can ignore warning not authored by Google</a:t>
+            </a:r>
           </a:p>
         </p:txBody>
       </p:sp>

</xml_diff>